<commit_message>
Update Developer Guide (#155)
* Add introduction
* Update diagrams
* Do some renaming and remove irrelevant information
</commit_message>
<xml_diff>
--- a/docs/diagrams/LogicComponentSequenceDiagram.pptx
+++ b/docs/diagrams/LogicComponentSequenceDiagram.pptx
@@ -208,7 +208,7 @@
           <a:p>
             <a:fld id="{F5CC4B3F-88C1-4FFA-B1B6-F41C21DC6924}" type="datetimeFigureOut">
               <a:rPr lang="en-US" smtClean="0"/>
-              <a:t>3/13/2018</a:t>
+              <a:t>4/10/2018</a:t>
             </a:fld>
             <a:endParaRPr lang="en-US"/>
           </a:p>
@@ -654,7 +654,7 @@
           <a:p>
             <a:fld id="{78C97017-6FC3-485B-9764-EAC9E56C1D49}" type="datetimeFigureOut">
               <a:rPr lang="en-US" smtClean="0"/>
-              <a:t>3/13/2018</a:t>
+              <a:t>4/10/2018</a:t>
             </a:fld>
             <a:endParaRPr lang="en-US"/>
           </a:p>
@@ -822,7 +822,7 @@
           <a:p>
             <a:fld id="{78C97017-6FC3-485B-9764-EAC9E56C1D49}" type="datetimeFigureOut">
               <a:rPr lang="en-US" smtClean="0"/>
-              <a:t>3/13/2018</a:t>
+              <a:t>4/10/2018</a:t>
             </a:fld>
             <a:endParaRPr lang="en-US"/>
           </a:p>
@@ -1000,7 +1000,7 @@
           <a:p>
             <a:fld id="{78C97017-6FC3-485B-9764-EAC9E56C1D49}" type="datetimeFigureOut">
               <a:rPr lang="en-US" smtClean="0"/>
-              <a:t>3/13/2018</a:t>
+              <a:t>4/10/2018</a:t>
             </a:fld>
             <a:endParaRPr lang="en-US"/>
           </a:p>
@@ -1168,7 +1168,7 @@
           <a:p>
             <a:fld id="{78C97017-6FC3-485B-9764-EAC9E56C1D49}" type="datetimeFigureOut">
               <a:rPr lang="en-US" smtClean="0"/>
-              <a:t>3/13/2018</a:t>
+              <a:t>4/10/2018</a:t>
             </a:fld>
             <a:endParaRPr lang="en-US"/>
           </a:p>
@@ -1413,7 +1413,7 @@
           <a:p>
             <a:fld id="{78C97017-6FC3-485B-9764-EAC9E56C1D49}" type="datetimeFigureOut">
               <a:rPr lang="en-US" smtClean="0"/>
-              <a:t>3/13/2018</a:t>
+              <a:t>4/10/2018</a:t>
             </a:fld>
             <a:endParaRPr lang="en-US"/>
           </a:p>
@@ -1698,7 +1698,7 @@
           <a:p>
             <a:fld id="{78C97017-6FC3-485B-9764-EAC9E56C1D49}" type="datetimeFigureOut">
               <a:rPr lang="en-US" smtClean="0"/>
-              <a:t>3/13/2018</a:t>
+              <a:t>4/10/2018</a:t>
             </a:fld>
             <a:endParaRPr lang="en-US"/>
           </a:p>
@@ -2117,7 +2117,7 @@
           <a:p>
             <a:fld id="{78C97017-6FC3-485B-9764-EAC9E56C1D49}" type="datetimeFigureOut">
               <a:rPr lang="en-US" smtClean="0"/>
-              <a:t>3/13/2018</a:t>
+              <a:t>4/10/2018</a:t>
             </a:fld>
             <a:endParaRPr lang="en-US"/>
           </a:p>
@@ -2234,7 +2234,7 @@
           <a:p>
             <a:fld id="{78C97017-6FC3-485B-9764-EAC9E56C1D49}" type="datetimeFigureOut">
               <a:rPr lang="en-US" smtClean="0"/>
-              <a:t>3/13/2018</a:t>
+              <a:t>4/10/2018</a:t>
             </a:fld>
             <a:endParaRPr lang="en-US"/>
           </a:p>
@@ -2329,7 +2329,7 @@
           <a:p>
             <a:fld id="{78C97017-6FC3-485B-9764-EAC9E56C1D49}" type="datetimeFigureOut">
               <a:rPr lang="en-US" smtClean="0"/>
-              <a:t>3/13/2018</a:t>
+              <a:t>4/10/2018</a:t>
             </a:fld>
             <a:endParaRPr lang="en-US"/>
           </a:p>
@@ -2604,7 +2604,7 @@
           <a:p>
             <a:fld id="{78C97017-6FC3-485B-9764-EAC9E56C1D49}" type="datetimeFigureOut">
               <a:rPr lang="en-US" smtClean="0"/>
-              <a:t>3/13/2018</a:t>
+              <a:t>4/10/2018</a:t>
             </a:fld>
             <a:endParaRPr lang="en-US"/>
           </a:p>
@@ -2856,7 +2856,7 @@
           <a:p>
             <a:fld id="{78C97017-6FC3-485B-9764-EAC9E56C1D49}" type="datetimeFigureOut">
               <a:rPr lang="en-US" smtClean="0"/>
-              <a:t>3/13/2018</a:t>
+              <a:t>4/10/2018</a:t>
             </a:fld>
             <a:endParaRPr lang="en-US"/>
           </a:p>
@@ -3067,7 +3067,7 @@
           <a:p>
             <a:fld id="{78C97017-6FC3-485B-9764-EAC9E56C1D49}" type="datetimeFigureOut">
               <a:rPr lang="en-US" smtClean="0"/>
-              <a:t>3/13/2018</a:t>
+              <a:t>4/10/2018</a:t>
             </a:fld>
             <a:endParaRPr lang="en-US"/>
           </a:p>
@@ -3450,8 +3450,8 @@
         </p:nvSpPr>
         <p:spPr>
           <a:xfrm>
-            <a:off x="685800" y="1981200"/>
-            <a:ext cx="7252956" cy="4000286"/>
+            <a:off x="685800" y="609605"/>
+            <a:ext cx="7252956" cy="5371881"/>
           </a:xfrm>
           <a:prstGeom prst="roundRect">
             <a:avLst>
@@ -3511,7 +3511,7 @@
         </p:nvSpPr>
         <p:spPr>
           <a:xfrm>
-            <a:off x="845045" y="2296546"/>
+            <a:off x="845045" y="955437"/>
             <a:ext cx="1455629" cy="346760"/>
           </a:xfrm>
           <a:prstGeom prst="rect">
@@ -3573,13 +3573,16 @@
       <p:cxnSp>
         <p:nvCxnSpPr>
           <p:cNvPr id="5" name="Straight Connector 4"/>
-          <p:cNvCxnSpPr/>
+          <p:cNvCxnSpPr>
+            <a:cxnSpLocks/>
+            <a:stCxn id="2" idx="2"/>
+          </p:cNvCxnSpPr>
           <p:nvPr/>
         </p:nvCxnSpPr>
         <p:spPr>
           <a:xfrm>
-            <a:off x="1572859" y="2660217"/>
-            <a:ext cx="0" cy="2597583"/>
+            <a:off x="1572860" y="1302197"/>
+            <a:ext cx="0" cy="3955603"/>
           </a:xfrm>
           <a:prstGeom prst="line">
             <a:avLst/>
@@ -3615,8 +3618,8 @@
         </p:nvSpPr>
         <p:spPr>
           <a:xfrm>
-            <a:off x="1500851" y="3010911"/>
-            <a:ext cx="152400" cy="2780287"/>
+            <a:off x="1500850" y="1584271"/>
+            <a:ext cx="167444" cy="4206928"/>
           </a:xfrm>
           <a:prstGeom prst="rect">
             <a:avLst/>
@@ -3662,7 +3665,7 @@
         </p:nvSpPr>
         <p:spPr>
           <a:xfrm>
-            <a:off x="2743200" y="2179309"/>
+            <a:off x="2743200" y="838200"/>
             <a:ext cx="1104349" cy="467684"/>
           </a:xfrm>
           <a:prstGeom prst="rect">
@@ -3724,13 +3727,15 @@
       <p:cxnSp>
         <p:nvCxnSpPr>
           <p:cNvPr id="17" name="Straight Connector 16"/>
-          <p:cNvCxnSpPr/>
+          <p:cNvCxnSpPr>
+            <a:cxnSpLocks/>
+          </p:cNvCxnSpPr>
           <p:nvPr/>
         </p:nvCxnSpPr>
         <p:spPr>
           <a:xfrm>
-            <a:off x="3356599" y="2663904"/>
-            <a:ext cx="0" cy="1695374"/>
+            <a:off x="3356599" y="2558625"/>
+            <a:ext cx="0" cy="1800653"/>
           </a:xfrm>
           <a:prstGeom prst="line">
             <a:avLst/>
@@ -3977,7 +3982,7 @@
         </p:nvCxnSpPr>
         <p:spPr>
           <a:xfrm>
-            <a:off x="381000" y="3014599"/>
+            <a:off x="381000" y="1584271"/>
             <a:ext cx="1119851" cy="0"/>
           </a:xfrm>
           <a:prstGeom prst="straightConnector1">
@@ -4049,7 +4054,7 @@
         </p:nvSpPr>
         <p:spPr>
           <a:xfrm>
-            <a:off x="0" y="2743200"/>
+            <a:off x="0" y="1312872"/>
             <a:ext cx="1424846" cy="215444"/>
           </a:xfrm>
           <a:prstGeom prst="rect">
@@ -4725,8 +4730,8 @@
         </p:nvSpPr>
         <p:spPr>
           <a:xfrm>
-            <a:off x="1742982" y="2850922"/>
-            <a:ext cx="1424846" cy="215444"/>
+            <a:off x="1734347" y="2663904"/>
+            <a:ext cx="1151205" cy="430887"/>
           </a:xfrm>
           <a:prstGeom prst="rect">
             <a:avLst/>
@@ -4751,8 +4756,12 @@
           </a:lstStyle>
           <a:p>
             <a:r>
+              <a:rPr lang="en-US" dirty="0" err="1"/>
+              <a:t>parseCommand</a:t>
+            </a:r>
+            <a:r>
               <a:rPr lang="en-US" dirty="0"/>
-              <a:t>parse(“delete 1”)</a:t>
+              <a:t>(“delete 1”)</a:t>
             </a:r>
           </a:p>
         </p:txBody>
@@ -5454,6 +5463,291 @@
                 </a:solidFill>
               </a:rPr>
               <a:t>X</a:t>
+            </a:r>
+          </a:p>
+        </p:txBody>
+      </p:sp>
+      <p:sp>
+        <p:nvSpPr>
+          <p:cNvPr id="48" name="Rectangle 47">
+            <a:extLst>
+              <a:ext uri="{FF2B5EF4-FFF2-40B4-BE49-F238E27FC236}">
+                <a16:creationId xmlns:a16="http://schemas.microsoft.com/office/drawing/2014/main" id="{B479FFE0-F32E-4991-8E5B-ABA93F2531CD}"/>
+              </a:ext>
+            </a:extLst>
+          </p:cNvPr>
+          <p:cNvSpPr/>
+          <p:nvPr/>
+        </p:nvSpPr>
+        <p:spPr>
+          <a:xfrm>
+            <a:off x="3269134" y="1726287"/>
+            <a:ext cx="174930" cy="837715"/>
+          </a:xfrm>
+          <a:prstGeom prst="rect">
+            <a:avLst/>
+          </a:prstGeom>
+          <a:solidFill>
+            <a:srgbClr val="0070C0"/>
+          </a:solidFill>
+          <a:ln>
+            <a:solidFill>
+              <a:srgbClr val="0070C0"/>
+            </a:solidFill>
+          </a:ln>
+          <a:effectLst/>
+        </p:spPr>
+        <p:style>
+          <a:lnRef idx="1">
+            <a:schemeClr val="accent3"/>
+          </a:lnRef>
+          <a:fillRef idx="2">
+            <a:schemeClr val="accent3"/>
+          </a:fillRef>
+          <a:effectRef idx="1">
+            <a:schemeClr val="accent3"/>
+          </a:effectRef>
+          <a:fontRef idx="minor">
+            <a:schemeClr val="dk1"/>
+          </a:fontRef>
+        </p:style>
+        <p:txBody>
+          <a:bodyPr rtlCol="0" anchor="ctr"/>
+          <a:lstStyle/>
+          <a:p>
+            <a:pPr algn="ctr"/>
+            <a:endParaRPr lang="en-SG" sz="1400">
+              <a:solidFill>
+                <a:schemeClr val="dk1"/>
+              </a:solidFill>
+            </a:endParaRPr>
+          </a:p>
+        </p:txBody>
+      </p:sp>
+      <p:cxnSp>
+        <p:nvCxnSpPr>
+          <p:cNvPr id="53" name="Straight Connector 52">
+            <a:extLst>
+              <a:ext uri="{FF2B5EF4-FFF2-40B4-BE49-F238E27FC236}">
+                <a16:creationId xmlns:a16="http://schemas.microsoft.com/office/drawing/2014/main" id="{6BD4B1CB-FC7A-4E9B-97B1-FF4208DA73FF}"/>
+              </a:ext>
+            </a:extLst>
+          </p:cNvPr>
+          <p:cNvCxnSpPr>
+            <a:cxnSpLocks/>
+            <a:endCxn id="48" idx="0"/>
+          </p:cNvCxnSpPr>
+          <p:nvPr/>
+        </p:nvCxnSpPr>
+        <p:spPr>
+          <a:xfrm>
+            <a:off x="3356598" y="1282124"/>
+            <a:ext cx="1" cy="444163"/>
+          </a:xfrm>
+          <a:prstGeom prst="line">
+            <a:avLst/>
+          </a:prstGeom>
+          <a:ln w="19050">
+            <a:solidFill>
+              <a:srgbClr val="0070C0"/>
+            </a:solidFill>
+            <a:prstDash val="sysDash"/>
+          </a:ln>
+          <a:effectLst/>
+        </p:spPr>
+        <p:style>
+          <a:lnRef idx="1">
+            <a:schemeClr val="accent1"/>
+          </a:lnRef>
+          <a:fillRef idx="2">
+            <a:schemeClr val="accent1"/>
+          </a:fillRef>
+          <a:effectRef idx="1">
+            <a:schemeClr val="accent1"/>
+          </a:effectRef>
+          <a:fontRef idx="minor">
+            <a:schemeClr val="dk1"/>
+          </a:fontRef>
+        </p:style>
+      </p:cxnSp>
+      <p:cxnSp>
+        <p:nvCxnSpPr>
+          <p:cNvPr id="54" name="Straight Arrow Connector 53">
+            <a:extLst>
+              <a:ext uri="{FF2B5EF4-FFF2-40B4-BE49-F238E27FC236}">
+                <a16:creationId xmlns:a16="http://schemas.microsoft.com/office/drawing/2014/main" id="{8FA94951-B610-4FB2-8CA3-8AC07F8A812D}"/>
+              </a:ext>
+            </a:extLst>
+          </p:cNvPr>
+          <p:cNvCxnSpPr/>
+          <p:nvPr/>
+        </p:nvCxnSpPr>
+        <p:spPr>
+          <a:xfrm flipV="1">
+            <a:off x="1673347" y="1752599"/>
+            <a:ext cx="1596514" cy="1"/>
+          </a:xfrm>
+          <a:prstGeom prst="straightConnector1">
+            <a:avLst/>
+          </a:prstGeom>
+          <a:ln w="19050">
+            <a:solidFill>
+              <a:srgbClr val="0070C0"/>
+            </a:solidFill>
+            <a:tailEnd type="arrow"/>
+          </a:ln>
+        </p:spPr>
+        <p:style>
+          <a:lnRef idx="1">
+            <a:schemeClr val="accent1"/>
+          </a:lnRef>
+          <a:fillRef idx="0">
+            <a:schemeClr val="accent1"/>
+          </a:fillRef>
+          <a:effectRef idx="0">
+            <a:schemeClr val="accent1"/>
+          </a:effectRef>
+          <a:fontRef idx="minor">
+            <a:schemeClr val="tx1"/>
+          </a:fontRef>
+        </p:style>
+      </p:cxnSp>
+      <p:sp>
+        <p:nvSpPr>
+          <p:cNvPr id="55" name="TextBox 54">
+            <a:extLst>
+              <a:ext uri="{FF2B5EF4-FFF2-40B4-BE49-F238E27FC236}">
+                <a16:creationId xmlns:a16="http://schemas.microsoft.com/office/drawing/2014/main" id="{C545F44A-0F31-4A38-BF75-383B033B1F1A}"/>
+              </a:ext>
+            </a:extLst>
+          </p:cNvPr>
+          <p:cNvSpPr txBox="1"/>
+          <p:nvPr/>
+        </p:nvSpPr>
+        <p:spPr>
+          <a:xfrm>
+            <a:off x="1754443" y="1295400"/>
+            <a:ext cx="1530144" cy="430887"/>
+          </a:xfrm>
+          <a:prstGeom prst="rect">
+            <a:avLst/>
+          </a:prstGeom>
+          <a:noFill/>
+        </p:spPr>
+        <p:txBody>
+          <a:bodyPr wrap="square" lIns="0" tIns="0" rIns="0" bIns="0" rtlCol="0">
+            <a:spAutoFit/>
+          </a:bodyPr>
+          <a:lstStyle>
+            <a:defPPr>
+              <a:defRPr lang="en-US"/>
+            </a:defPPr>
+            <a:lvl1pPr algn="r">
+              <a:defRPr sz="1400">
+                <a:solidFill>
+                  <a:srgbClr val="0070C0"/>
+                </a:solidFill>
+              </a:defRPr>
+            </a:lvl1pPr>
+          </a:lstStyle>
+          <a:p>
+            <a:r>
+              <a:rPr lang="en-US" dirty="0" err="1"/>
+              <a:t>applyCommandAlias</a:t>
+            </a:r>
+            <a:r>
+              <a:rPr lang="en-US" dirty="0"/>
+              <a:t>(“delete 1”)</a:t>
+            </a:r>
+          </a:p>
+        </p:txBody>
+      </p:sp>
+      <p:cxnSp>
+        <p:nvCxnSpPr>
+          <p:cNvPr id="56" name="Straight Arrow Connector 55">
+            <a:extLst>
+              <a:ext uri="{FF2B5EF4-FFF2-40B4-BE49-F238E27FC236}">
+                <a16:creationId xmlns:a16="http://schemas.microsoft.com/office/drawing/2014/main" id="{936A1AD6-1862-4612-8148-0A3352C3A217}"/>
+              </a:ext>
+            </a:extLst>
+          </p:cNvPr>
+          <p:cNvCxnSpPr/>
+          <p:nvPr/>
+        </p:nvCxnSpPr>
+        <p:spPr>
+          <a:xfrm flipV="1">
+            <a:off x="1661664" y="2558625"/>
+            <a:ext cx="1596514" cy="5378"/>
+          </a:xfrm>
+          <a:prstGeom prst="straightConnector1">
+            <a:avLst/>
+          </a:prstGeom>
+          <a:ln w="19050">
+            <a:solidFill>
+              <a:srgbClr val="0070C0"/>
+            </a:solidFill>
+            <a:prstDash val="sysDash"/>
+            <a:headEnd type="arrow" w="med" len="med"/>
+            <a:tailEnd type="none" w="med" len="med"/>
+          </a:ln>
+        </p:spPr>
+        <p:style>
+          <a:lnRef idx="1">
+            <a:schemeClr val="accent1"/>
+          </a:lnRef>
+          <a:fillRef idx="0">
+            <a:schemeClr val="accent1"/>
+          </a:fillRef>
+          <a:effectRef idx="0">
+            <a:schemeClr val="accent1"/>
+          </a:effectRef>
+          <a:fontRef idx="minor">
+            <a:schemeClr val="tx1"/>
+          </a:fontRef>
+        </p:style>
+      </p:cxnSp>
+      <p:sp>
+        <p:nvSpPr>
+          <p:cNvPr id="59" name="TextBox 58">
+            <a:extLst>
+              <a:ext uri="{FF2B5EF4-FFF2-40B4-BE49-F238E27FC236}">
+                <a16:creationId xmlns:a16="http://schemas.microsoft.com/office/drawing/2014/main" id="{90984C5F-4F70-40C8-BCCA-3E2D823E9948}"/>
+              </a:ext>
+            </a:extLst>
+          </p:cNvPr>
+          <p:cNvSpPr txBox="1"/>
+          <p:nvPr/>
+        </p:nvSpPr>
+        <p:spPr>
+          <a:xfrm>
+            <a:off x="1977354" y="2304467"/>
+            <a:ext cx="1070646" cy="215444"/>
+          </a:xfrm>
+          <a:prstGeom prst="rect">
+            <a:avLst/>
+          </a:prstGeom>
+          <a:noFill/>
+        </p:spPr>
+        <p:txBody>
+          <a:bodyPr wrap="square" lIns="0" tIns="0" rIns="0" bIns="0" rtlCol="0">
+            <a:spAutoFit/>
+          </a:bodyPr>
+          <a:lstStyle>
+            <a:defPPr>
+              <a:defRPr lang="en-US"/>
+            </a:defPPr>
+            <a:lvl1pPr algn="r">
+              <a:defRPr sz="1400">
+                <a:solidFill>
+                  <a:srgbClr val="0070C0"/>
+                </a:solidFill>
+              </a:defRPr>
+            </a:lvl1pPr>
+          </a:lstStyle>
+          <a:p>
+            <a:r>
+              <a:rPr lang="en-US" dirty="0"/>
+              <a:t>delete 1</a:t>
             </a:r>
           </a:p>
         </p:txBody>

</xml_diff>